<commit_message>
Aspirations presentation -- final
</commit_message>
<xml_diff>
--- a/STEM-Conference-AiC.pptx
+++ b/STEM-Conference-AiC.pptx
@@ -5,7 +5,7 @@
     <p:sldMasterId id="2147483722" r:id="rId1"/>
   </p:sldMasterIdLst>
   <p:notesMasterIdLst>
-    <p:notesMasterId r:id="rId21"/>
+    <p:notesMasterId r:id="rId23"/>
   </p:notesMasterIdLst>
   <p:sldIdLst>
     <p:sldId id="256" r:id="rId2"/>
@@ -25,8 +25,10 @@
     <p:sldId id="264" r:id="rId16"/>
     <p:sldId id="279" r:id="rId17"/>
     <p:sldId id="281" r:id="rId18"/>
-    <p:sldId id="280" r:id="rId19"/>
-    <p:sldId id="282" r:id="rId20"/>
+    <p:sldId id="283" r:id="rId19"/>
+    <p:sldId id="284" r:id="rId20"/>
+    <p:sldId id="280" r:id="rId21"/>
+    <p:sldId id="282" r:id="rId22"/>
   </p:sldIdLst>
   <p:sldSz cx="12192000" cy="6858000"/>
   <p:notesSz cx="6858000" cy="9144000"/>
@@ -210,7 +212,7 @@
           <a:p>
             <a:fld id="{AFDA47E1-DE78-494E-85B8-F5D50F026B0A}" type="datetimeFigureOut">
               <a:rPr lang="en-US" smtClean="0"/>
-              <a:t>7/20/2018</a:t>
+              <a:t>7/25/2018</a:t>
             </a:fld>
             <a:endParaRPr lang="en-US"/>
           </a:p>
@@ -2182,7 +2184,7 @@
           <a:p>
             <a:fld id="{F995535C-7882-4197-B202-7AFB9434B5B9}" type="datetimeFigureOut">
               <a:rPr lang="en-US" smtClean="0"/>
-              <a:t>7/20/2018</a:t>
+              <a:t>7/25/2018</a:t>
             </a:fld>
             <a:endParaRPr lang="en-US"/>
           </a:p>
@@ -2381,7 +2383,7 @@
           <a:p>
             <a:fld id="{F995535C-7882-4197-B202-7AFB9434B5B9}" type="datetimeFigureOut">
               <a:rPr lang="en-US" smtClean="0"/>
-              <a:t>7/20/2018</a:t>
+              <a:t>7/25/2018</a:t>
             </a:fld>
             <a:endParaRPr lang="en-US"/>
           </a:p>
@@ -2594,7 +2596,7 @@
           <a:p>
             <a:fld id="{F995535C-7882-4197-B202-7AFB9434B5B9}" type="datetimeFigureOut">
               <a:rPr lang="en-US" smtClean="0"/>
-              <a:t>7/20/2018</a:t>
+              <a:t>7/25/2018</a:t>
             </a:fld>
             <a:endParaRPr lang="en-US"/>
           </a:p>
@@ -2763,7 +2765,7 @@
           <a:p>
             <a:fld id="{F995535C-7882-4197-B202-7AFB9434B5B9}" type="datetimeFigureOut">
               <a:rPr lang="en-US" smtClean="0"/>
-              <a:t>7/20/2018</a:t>
+              <a:t>7/25/2018</a:t>
             </a:fld>
             <a:endParaRPr lang="en-US"/>
           </a:p>
@@ -3236,7 +3238,7 @@
           <a:p>
             <a:fld id="{F995535C-7882-4197-B202-7AFB9434B5B9}" type="datetimeFigureOut">
               <a:rPr lang="en-US" smtClean="0"/>
-              <a:t>7/20/2018</a:t>
+              <a:t>7/25/2018</a:t>
             </a:fld>
             <a:endParaRPr lang="en-US"/>
           </a:p>
@@ -3695,7 +3697,7 @@
           <a:p>
             <a:fld id="{F995535C-7882-4197-B202-7AFB9434B5B9}" type="datetimeFigureOut">
               <a:rPr lang="en-US" smtClean="0"/>
-              <a:t>7/20/2018</a:t>
+              <a:t>7/25/2018</a:t>
             </a:fld>
             <a:endParaRPr lang="en-US"/>
           </a:p>
@@ -3832,7 +3834,7 @@
           <a:p>
             <a:fld id="{F995535C-7882-4197-B202-7AFB9434B5B9}" type="datetimeFigureOut">
               <a:rPr lang="en-US" smtClean="0"/>
-              <a:t>7/20/2018</a:t>
+              <a:t>7/25/2018</a:t>
             </a:fld>
             <a:endParaRPr lang="en-US"/>
           </a:p>
@@ -3946,7 +3948,7 @@
           <a:p>
             <a:fld id="{F995535C-7882-4197-B202-7AFB9434B5B9}" type="datetimeFigureOut">
               <a:rPr lang="en-US" smtClean="0"/>
-              <a:t>7/20/2018</a:t>
+              <a:t>7/25/2018</a:t>
             </a:fld>
             <a:endParaRPr lang="en-US"/>
           </a:p>
@@ -4249,7 +4251,7 @@
           <a:p>
             <a:fld id="{F995535C-7882-4197-B202-7AFB9434B5B9}" type="datetimeFigureOut">
               <a:rPr lang="en-US" smtClean="0"/>
-              <a:t>7/20/2018</a:t>
+              <a:t>7/25/2018</a:t>
             </a:fld>
             <a:endParaRPr lang="en-US"/>
           </a:p>
@@ -4581,7 +4583,7 @@
           <a:p>
             <a:fld id="{F995535C-7882-4197-B202-7AFB9434B5B9}" type="datetimeFigureOut">
               <a:rPr lang="en-US" smtClean="0"/>
-              <a:t>7/20/2018</a:t>
+              <a:t>7/25/2018</a:t>
             </a:fld>
             <a:endParaRPr lang="en-US"/>
           </a:p>
@@ -4813,7 +4815,7 @@
           <a:p>
             <a:fld id="{F995535C-7882-4197-B202-7AFB9434B5B9}" type="datetimeFigureOut">
               <a:rPr lang="en-US" smtClean="0"/>
-              <a:t>7/20/2018</a:t>
+              <a:t>7/25/2018</a:t>
             </a:fld>
             <a:endParaRPr lang="en-US"/>
           </a:p>
@@ -5257,7 +5259,7 @@
   </p:txStyles>
   <p:extLst mod="1">
     <p:ext uri="{27BBF7A9-308A-43DC-89C8-2F10F3537804}">
-      <p15:sldGuideLst xmlns="" xmlns:p15="http://schemas.microsoft.com/office/powerpoint/2012/main">
+      <p15:sldGuideLst xmlns:p15="http://schemas.microsoft.com/office/powerpoint/2012/main" xmlns="">
         <p15:guide id="1" orient="horz" pos="2160">
           <p15:clr>
             <a:srgbClr val="F26B43"/>
@@ -5331,8 +5333,8 @@
         </p:nvSpPr>
         <p:spPr>
           <a:xfrm>
-            <a:off x="833074" y="4047516"/>
-            <a:ext cx="8639174" cy="1579562"/>
+            <a:off x="833073" y="4047516"/>
+            <a:ext cx="11042403" cy="1579562"/>
           </a:xfrm>
         </p:spPr>
         <p:txBody>
@@ -5363,7 +5365,15 @@
             </a:br>
             <a:r>
               <a:rPr lang="en-US" dirty="0" smtClean="0"/>
-              <a:t>	 Computer Science Coordinator</a:t>
+              <a:t>	 Computer Science </a:t>
+            </a:r>
+            <a:r>
+              <a:rPr lang="en-US" dirty="0" smtClean="0"/>
+              <a:t>Coordinator	Regional Coordinator</a:t>
+            </a:r>
+            <a:r>
+              <a:rPr lang="en-US" dirty="0" smtClean="0"/>
+              <a:t/>
             </a:r>
             <a:br>
               <a:rPr lang="en-US" dirty="0" smtClean="0"/>
@@ -5376,17 +5386,22 @@
               <a:rPr lang="en-US" dirty="0" smtClean="0"/>
               <a:t> West Texas A&amp;M University	</a:t>
             </a:r>
+            <a:r>
+              <a:rPr lang="en-US" dirty="0" smtClean="0"/>
+              <a:t>	Panhandle Plains Community</a:t>
+            </a:r>
             <a:endParaRPr lang="en-US" dirty="0" smtClean="0"/>
           </a:p>
           <a:p>
             <a:r>
               <a:rPr lang="en-US" dirty="0" smtClean="0"/>
-              <a:t>	 hhaiduk@wtamu.edu </a:t>
+              <a:t>	 hhaiduk@wtamu.edu 			</a:t>
             </a:r>
             <a:r>
               <a:rPr lang="en-US" dirty="0" smtClean="0"/>
-              <a:t>					</a:t>
-            </a:r>
+              <a:t>Aspirations in Computing</a:t>
+            </a:r>
+            <a:endParaRPr lang="en-US" dirty="0" smtClean="0"/>
           </a:p>
         </p:txBody>
       </p:sp>
@@ -5412,6 +5427,13 @@
       </p:transition>
     </mc:Fallback>
   </mc:AlternateContent>
+  <p:timing>
+    <p:tnLst>
+      <p:par>
+        <p:cTn id="1" dur="indefinite" restart="never" nodeType="tmRoot"/>
+      </p:par>
+    </p:tnLst>
+  </p:timing>
 </p:sld>
 </file>
 
@@ -5600,6 +5622,13 @@
       </p:transition>
     </mc:Fallback>
   </mc:AlternateContent>
+  <p:timing>
+    <p:tnLst>
+      <p:par>
+        <p:cTn id="1" dur="indefinite" restart="never" nodeType="tmRoot"/>
+      </p:par>
+    </p:tnLst>
+  </p:timing>
 </p:sld>
 </file>
 
@@ -5834,6 +5863,13 @@
       </p:transition>
     </mc:Fallback>
   </mc:AlternateContent>
+  <p:timing>
+    <p:tnLst>
+      <p:par>
+        <p:cTn id="1" dur="indefinite" restart="never" nodeType="tmRoot"/>
+      </p:par>
+    </p:tnLst>
+  </p:timing>
 </p:sld>
 </file>
 
@@ -6145,6 +6181,13 @@
       </p:transition>
     </mc:Fallback>
   </mc:AlternateContent>
+  <p:timing>
+    <p:tnLst>
+      <p:par>
+        <p:cTn id="1" dur="indefinite" restart="never" nodeType="tmRoot"/>
+      </p:par>
+    </p:tnLst>
+  </p:timing>
 </p:sld>
 </file>
 
@@ -6307,6 +6350,13 @@
       </p:transition>
     </mc:Fallback>
   </mc:AlternateContent>
+  <p:timing>
+    <p:tnLst>
+      <p:par>
+        <p:cTn id="1" dur="indefinite" restart="never" nodeType="tmRoot"/>
+      </p:par>
+    </p:tnLst>
+  </p:timing>
 </p:sld>
 </file>
 
@@ -6469,6 +6519,13 @@
       </p:transition>
     </mc:Fallback>
   </mc:AlternateContent>
+  <p:timing>
+    <p:tnLst>
+      <p:par>
+        <p:cTn id="1" dur="indefinite" restart="never" nodeType="tmRoot"/>
+      </p:par>
+    </p:tnLst>
+  </p:timing>
 </p:sld>
 </file>
 
@@ -6539,6 +6596,13 @@
       </p:transition>
     </mc:Fallback>
   </mc:AlternateContent>
+  <p:timing>
+    <p:tnLst>
+      <p:par>
+        <p:cTn id="1" dur="indefinite" restart="never" nodeType="tmRoot"/>
+      </p:par>
+    </p:tnLst>
+  </p:timing>
 </p:sld>
 </file>
 
@@ -6611,6 +6675,13 @@
       </p:transition>
     </mc:Fallback>
   </mc:AlternateContent>
+  <p:timing>
+    <p:tnLst>
+      <p:par>
+        <p:cTn id="1" dur="indefinite" restart="never" nodeType="tmRoot"/>
+      </p:par>
+    </p:tnLst>
+  </p:timing>
 </p:sld>
 </file>
 
@@ -6683,10 +6754,330 @@
       </p:transition>
     </mc:Fallback>
   </mc:AlternateContent>
+  <p:timing>
+    <p:tnLst>
+      <p:par>
+        <p:cTn id="1" dur="indefinite" restart="never" nodeType="tmRoot"/>
+      </p:par>
+    </p:tnLst>
+  </p:timing>
 </p:sld>
 </file>
 
 <file path=ppt/slides/slide18.xml><?xml version="1.0" encoding="utf-8"?>
+<p:sld xmlns:a="http://schemas.openxmlformats.org/drawingml/2006/main" xmlns:r="http://schemas.openxmlformats.org/officeDocument/2006/relationships" xmlns:p="http://schemas.openxmlformats.org/presentationml/2006/main">
+  <p:cSld>
+    <p:spTree>
+      <p:nvGrpSpPr>
+        <p:cNvPr id="1" name=""/>
+        <p:cNvGrpSpPr/>
+        <p:nvPr/>
+      </p:nvGrpSpPr>
+      <p:grpSpPr>
+        <a:xfrm>
+          <a:off x="0" y="0"/>
+          <a:ext cx="0" cy="0"/>
+          <a:chOff x="0" y="0"/>
+          <a:chExt cx="0" cy="0"/>
+        </a:xfrm>
+      </p:grpSpPr>
+      <p:sp>
+        <p:nvSpPr>
+          <p:cNvPr id="2" name="Title 1"/>
+          <p:cNvSpPr>
+            <a:spLocks noGrp="1"/>
+          </p:cNvSpPr>
+          <p:nvPr>
+            <p:ph type="title"/>
+          </p:nvPr>
+        </p:nvSpPr>
+        <p:spPr/>
+        <p:txBody>
+          <a:bodyPr/>
+          <a:lstStyle/>
+          <a:p>
+            <a:r>
+              <a:rPr lang="en-US" dirty="0" smtClean="0"/>
+              <a:t>Process and where you can make a difference</a:t>
+            </a:r>
+            <a:endParaRPr lang="en-US" dirty="0"/>
+          </a:p>
+        </p:txBody>
+      </p:sp>
+      <p:sp>
+        <p:nvSpPr>
+          <p:cNvPr id="3" name="Content Placeholder 2"/>
+          <p:cNvSpPr>
+            <a:spLocks noGrp="1"/>
+          </p:cNvSpPr>
+          <p:nvPr>
+            <p:ph idx="1"/>
+          </p:nvPr>
+        </p:nvSpPr>
+        <p:spPr/>
+        <p:txBody>
+          <a:bodyPr>
+            <a:normAutofit lnSpcReduction="10000"/>
+          </a:bodyPr>
+          <a:lstStyle/>
+          <a:p>
+            <a:r>
+              <a:rPr lang="en-US" sz="2400" dirty="0" smtClean="0"/>
+              <a:t>Starting Sept. 1, applications open for high school girls ages 15 up.  Please note that this initiative is for “aspirations” – meaning  some demonstrated desire to be in computing.  We know that many girls have financial challenges, little family support, etc.  Do they demonstrate  real aspirations to , perhaps, be the first family member to go to university?</a:t>
+            </a:r>
+          </a:p>
+          <a:p>
+            <a:r>
+              <a:rPr lang="en-US" sz="2400" dirty="0" smtClean="0"/>
+              <a:t>Your help in guiding them through the process can make the difference.  And your willingness to give them a recommendation.</a:t>
+            </a:r>
+          </a:p>
+          <a:p>
+            <a:r>
+              <a:rPr lang="en-US" sz="2400" dirty="0" smtClean="0"/>
+              <a:t>Applications close in October or November.  Then applications are reviewed with winners and runners up selected</a:t>
+            </a:r>
+          </a:p>
+          <a:p>
+            <a:r>
+              <a:rPr lang="en-US" sz="2400" dirty="0" smtClean="0"/>
+              <a:t>Similar process for teachers, counselors, etc.</a:t>
+            </a:r>
+          </a:p>
+        </p:txBody>
+      </p:sp>
+    </p:spTree>
+    <p:extLst>
+      <p:ext uri="{BB962C8B-B14F-4D97-AF65-F5344CB8AC3E}">
+        <p14:creationId xmlns:p14="http://schemas.microsoft.com/office/powerpoint/2010/main" val="2493363807"/>
+      </p:ext>
+    </p:extLst>
+  </p:cSld>
+  <p:clrMapOvr>
+    <a:masterClrMapping/>
+  </p:clrMapOvr>
+  <mc:AlternateContent xmlns:mc="http://schemas.openxmlformats.org/markup-compatibility/2006" xmlns:p14="http://schemas.microsoft.com/office/powerpoint/2010/main">
+    <mc:Choice Requires="p14">
+      <p:transition spd="med" p14:dur="700">
+        <p:fade/>
+      </p:transition>
+    </mc:Choice>
+    <mc:Fallback xmlns="">
+      <p:transition spd="med">
+        <p:fade/>
+      </p:transition>
+    </mc:Fallback>
+  </mc:AlternateContent>
+  <p:timing>
+    <p:tnLst>
+      <p:par>
+        <p:cTn id="1" dur="indefinite" restart="never" nodeType="tmRoot"/>
+      </p:par>
+    </p:tnLst>
+  </p:timing>
+</p:sld>
+</file>
+
+<file path=ppt/slides/slide19.xml><?xml version="1.0" encoding="utf-8"?>
+<p:sld xmlns:a="http://schemas.openxmlformats.org/drawingml/2006/main" xmlns:r="http://schemas.openxmlformats.org/officeDocument/2006/relationships" xmlns:p="http://schemas.openxmlformats.org/presentationml/2006/main">
+  <p:cSld>
+    <p:spTree>
+      <p:nvGrpSpPr>
+        <p:cNvPr id="1" name=""/>
+        <p:cNvGrpSpPr/>
+        <p:nvPr/>
+      </p:nvGrpSpPr>
+      <p:grpSpPr>
+        <a:xfrm>
+          <a:off x="0" y="0"/>
+          <a:ext cx="0" cy="0"/>
+          <a:chOff x="0" y="0"/>
+          <a:chExt cx="0" cy="0"/>
+        </a:xfrm>
+      </p:grpSpPr>
+      <p:sp>
+        <p:nvSpPr>
+          <p:cNvPr id="2" name="Title 1"/>
+          <p:cNvSpPr>
+            <a:spLocks noGrp="1"/>
+          </p:cNvSpPr>
+          <p:nvPr>
+            <p:ph type="title"/>
+          </p:nvPr>
+        </p:nvSpPr>
+        <p:spPr/>
+        <p:txBody>
+          <a:bodyPr/>
+          <a:lstStyle/>
+          <a:p>
+            <a:r>
+              <a:rPr lang="en-US" dirty="0" smtClean="0"/>
+              <a:t>And then in spring – Awards Ceremony</a:t>
+            </a:r>
+            <a:br>
+              <a:rPr lang="en-US" dirty="0" smtClean="0"/>
+            </a:br>
+            <a:endParaRPr lang="en-US" dirty="0"/>
+          </a:p>
+        </p:txBody>
+      </p:sp>
+      <p:sp>
+        <p:nvSpPr>
+          <p:cNvPr id="3" name="Content Placeholder 2"/>
+          <p:cNvSpPr>
+            <a:spLocks noGrp="1"/>
+          </p:cNvSpPr>
+          <p:nvPr>
+            <p:ph idx="1"/>
+          </p:nvPr>
+        </p:nvSpPr>
+        <p:spPr/>
+        <p:txBody>
+          <a:bodyPr/>
+          <a:lstStyle/>
+          <a:p>
+            <a:r>
+              <a:rPr lang="en-US" sz="2800" dirty="0" smtClean="0"/>
+              <a:t>In past held on WTAMU campus in conjunction with a technology outreach event – sometime February </a:t>
+            </a:r>
+            <a:r>
+              <a:rPr lang="en-US" sz="2800" smtClean="0"/>
+              <a:t>through early April</a:t>
+            </a:r>
+            <a:endParaRPr lang="en-US" sz="2800" dirty="0" smtClean="0"/>
+          </a:p>
+          <a:p>
+            <a:r>
+              <a:rPr lang="en-US" sz="2800" dirty="0" smtClean="0"/>
+              <a:t>YOU can make a profound difference in the lives of these girls!</a:t>
+            </a:r>
+          </a:p>
+          <a:p>
+            <a:r>
+              <a:rPr lang="en-US" sz="2800" dirty="0" smtClean="0"/>
+              <a:t>Resources</a:t>
+            </a:r>
+          </a:p>
+          <a:p>
+            <a:endParaRPr lang="en-US" dirty="0"/>
+          </a:p>
+        </p:txBody>
+      </p:sp>
+    </p:spTree>
+    <p:extLst>
+      <p:ext uri="{BB962C8B-B14F-4D97-AF65-F5344CB8AC3E}">
+        <p14:creationId xmlns:p14="http://schemas.microsoft.com/office/powerpoint/2010/main" val="1344980102"/>
+      </p:ext>
+    </p:extLst>
+  </p:cSld>
+  <p:clrMapOvr>
+    <a:masterClrMapping/>
+  </p:clrMapOvr>
+  <mc:AlternateContent xmlns:mc="http://schemas.openxmlformats.org/markup-compatibility/2006" xmlns:p14="http://schemas.microsoft.com/office/powerpoint/2010/main">
+    <mc:Choice Requires="p14">
+      <p:transition spd="med" p14:dur="700">
+        <p:fade/>
+      </p:transition>
+    </mc:Choice>
+    <mc:Fallback xmlns="">
+      <p:transition spd="med">
+        <p:fade/>
+      </p:transition>
+    </mc:Fallback>
+  </mc:AlternateContent>
+  <p:timing>
+    <p:tnLst>
+      <p:par>
+        <p:cTn id="1" dur="indefinite" restart="never" nodeType="tmRoot"/>
+      </p:par>
+    </p:tnLst>
+  </p:timing>
+</p:sld>
+</file>
+
+<file path=ppt/slides/slide2.xml><?xml version="1.0" encoding="utf-8"?>
+<p:sld xmlns:a="http://schemas.openxmlformats.org/drawingml/2006/main" xmlns:r="http://schemas.openxmlformats.org/officeDocument/2006/relationships" xmlns:p="http://schemas.openxmlformats.org/presentationml/2006/main">
+  <p:cSld>
+    <p:spTree>
+      <p:nvGrpSpPr>
+        <p:cNvPr id="1" name=""/>
+        <p:cNvGrpSpPr/>
+        <p:nvPr/>
+      </p:nvGrpSpPr>
+      <p:grpSpPr>
+        <a:xfrm>
+          <a:off x="0" y="0"/>
+          <a:ext cx="0" cy="0"/>
+          <a:chOff x="0" y="0"/>
+          <a:chExt cx="0" cy="0"/>
+        </a:xfrm>
+      </p:grpSpPr>
+      <p:sp>
+        <p:nvSpPr>
+          <p:cNvPr id="2" name="Title 1"/>
+          <p:cNvSpPr>
+            <a:spLocks noGrp="1"/>
+          </p:cNvSpPr>
+          <p:nvPr>
+            <p:ph type="title"/>
+          </p:nvPr>
+        </p:nvSpPr>
+        <p:spPr/>
+        <p:txBody>
+          <a:bodyPr/>
+          <a:lstStyle/>
+          <a:p>
+            <a:r>
+              <a:rPr lang="en-US" dirty="0" smtClean="0"/>
+              <a:t>Let’s Look at Some Facts</a:t>
+            </a:r>
+            <a:endParaRPr lang="en-US" dirty="0"/>
+          </a:p>
+        </p:txBody>
+      </p:sp>
+      <p:sp>
+        <p:nvSpPr>
+          <p:cNvPr id="3" name="Text Placeholder 2"/>
+          <p:cNvSpPr>
+            <a:spLocks noGrp="1"/>
+          </p:cNvSpPr>
+          <p:nvPr>
+            <p:ph type="body" sz="half" idx="2"/>
+          </p:nvPr>
+        </p:nvSpPr>
+        <p:spPr/>
+        <p:txBody>
+          <a:bodyPr/>
+          <a:lstStyle/>
+          <a:p>
+            <a:r>
+              <a:rPr lang="en-US" dirty="0"/>
+              <a:t>Source:  NCWIT -- https://www.ncwit.org/resources/numbers</a:t>
+            </a:r>
+          </a:p>
+        </p:txBody>
+      </p:sp>
+    </p:spTree>
+    <p:extLst>
+      <p:ext uri="{BB962C8B-B14F-4D97-AF65-F5344CB8AC3E}">
+        <p14:creationId xmlns:p14="http://schemas.microsoft.com/office/powerpoint/2010/main" val="1861067087"/>
+      </p:ext>
+    </p:extLst>
+  </p:cSld>
+  <p:clrMapOvr>
+    <a:masterClrMapping/>
+  </p:clrMapOvr>
+  <p:timing>
+    <p:tnLst>
+      <p:par>
+        <p:cTn id="1" dur="indefinite" restart="never" nodeType="tmRoot"/>
+      </p:par>
+    </p:tnLst>
+  </p:timing>
+</p:sld>
+</file>
+
+<file path=ppt/slides/slide20.xml><?xml version="1.0" encoding="utf-8"?>
 <p:sld xmlns:a="http://schemas.openxmlformats.org/drawingml/2006/main" xmlns:r="http://schemas.openxmlformats.org/officeDocument/2006/relationships" xmlns:p="http://schemas.openxmlformats.org/presentationml/2006/main">
   <p:cSld>
     <p:spTree>
@@ -6832,9 +7223,18 @@
           </a:bodyPr>
           <a:lstStyle/>
           <a:p>
+            <a:pPr algn="ctr"/>
             <a:r>
               <a:rPr lang="en-US" dirty="0" smtClean="0"/>
-              <a:t>Named after TPWD region designation omitting rolling plains – includes all of Regions 16 and 17</a:t>
+              <a:t>Named after TPWD region designation </a:t>
+            </a:r>
+            <a:r>
+              <a:rPr lang="en-US" dirty="0" smtClean="0"/>
+              <a:t>– </a:t>
+            </a:r>
+            <a:r>
+              <a:rPr lang="en-US" dirty="0" smtClean="0"/>
+              <a:t>includes all of Regions 16 and 17</a:t>
             </a:r>
             <a:endParaRPr lang="en-US" dirty="0"/>
           </a:p>
@@ -6862,10 +7262,17 @@
       </p:transition>
     </mc:Fallback>
   </mc:AlternateContent>
+  <p:timing>
+    <p:tnLst>
+      <p:par>
+        <p:cTn id="1" dur="indefinite" restart="never" nodeType="tmRoot"/>
+      </p:par>
+    </p:tnLst>
+  </p:timing>
 </p:sld>
 </file>
 
-<file path=ppt/slides/slide19.xml><?xml version="1.0" encoding="utf-8"?>
+<file path=ppt/slides/slide21.xml><?xml version="1.0" encoding="utf-8"?>
 <p:sld xmlns:a="http://schemas.openxmlformats.org/drawingml/2006/main" xmlns:r="http://schemas.openxmlformats.org/officeDocument/2006/relationships" xmlns:p="http://schemas.openxmlformats.org/presentationml/2006/main">
   <p:cSld>
     <p:spTree>
@@ -7006,7 +7413,15 @@
             </a:r>
             <a:r>
               <a:rPr lang="en-US" dirty="0"/>
-              <a:t> @ https://github.com/HHaiduk/thunder</a:t>
+              <a:t> </a:t>
+            </a:r>
+            <a:r>
+              <a:rPr lang="en-US" dirty="0" smtClean="0"/>
+              <a:t>-- </a:t>
+            </a:r>
+            <a:r>
+              <a:rPr lang="en-US" dirty="0"/>
+              <a:t>https://github.com/HHaiduk/thunder</a:t>
             </a:r>
           </a:p>
           <a:p>
@@ -7045,81 +7460,13 @@
       </p:transition>
     </mc:Fallback>
   </mc:AlternateContent>
-</p:sld>
-</file>
-
-<file path=ppt/slides/slide2.xml><?xml version="1.0" encoding="utf-8"?>
-<p:sld xmlns:a="http://schemas.openxmlformats.org/drawingml/2006/main" xmlns:r="http://schemas.openxmlformats.org/officeDocument/2006/relationships" xmlns:p="http://schemas.openxmlformats.org/presentationml/2006/main">
-  <p:cSld>
-    <p:spTree>
-      <p:nvGrpSpPr>
-        <p:cNvPr id="1" name=""/>
-        <p:cNvGrpSpPr/>
-        <p:nvPr/>
-      </p:nvGrpSpPr>
-      <p:grpSpPr>
-        <a:xfrm>
-          <a:off x="0" y="0"/>
-          <a:ext cx="0" cy="0"/>
-          <a:chOff x="0" y="0"/>
-          <a:chExt cx="0" cy="0"/>
-        </a:xfrm>
-      </p:grpSpPr>
-      <p:sp>
-        <p:nvSpPr>
-          <p:cNvPr id="2" name="Title 1"/>
-          <p:cNvSpPr>
-            <a:spLocks noGrp="1"/>
-          </p:cNvSpPr>
-          <p:nvPr>
-            <p:ph type="title"/>
-          </p:nvPr>
-        </p:nvSpPr>
-        <p:spPr/>
-        <p:txBody>
-          <a:bodyPr/>
-          <a:lstStyle/>
-          <a:p>
-            <a:r>
-              <a:rPr lang="en-US" dirty="0" smtClean="0"/>
-              <a:t>Let’s Look at Some Facts</a:t>
-            </a:r>
-            <a:endParaRPr lang="en-US" dirty="0"/>
-          </a:p>
-        </p:txBody>
-      </p:sp>
-      <p:sp>
-        <p:nvSpPr>
-          <p:cNvPr id="3" name="Text Placeholder 2"/>
-          <p:cNvSpPr>
-            <a:spLocks noGrp="1"/>
-          </p:cNvSpPr>
-          <p:nvPr>
-            <p:ph type="body" sz="half" idx="2"/>
-          </p:nvPr>
-        </p:nvSpPr>
-        <p:spPr/>
-        <p:txBody>
-          <a:bodyPr/>
-          <a:lstStyle/>
-          <a:p>
-            <a:r>
-              <a:rPr lang="en-US" dirty="0"/>
-              <a:t>Source:  NCWIT -- https://www.ncwit.org/resources/numbers</a:t>
-            </a:r>
-          </a:p>
-        </p:txBody>
-      </p:sp>
-    </p:spTree>
-    <p:extLst>
-      <p:ext uri="{BB962C8B-B14F-4D97-AF65-F5344CB8AC3E}">
-        <p14:creationId xmlns:p14="http://schemas.microsoft.com/office/powerpoint/2010/main" val="1861067087"/>
-      </p:ext>
-    </p:extLst>
-  </p:cSld>
-  <p:clrMapOvr>
-    <a:masterClrMapping/>
-  </p:clrMapOvr>
+  <p:timing>
+    <p:tnLst>
+      <p:par>
+        <p:cTn id="1" dur="indefinite" restart="never" nodeType="tmRoot"/>
+      </p:par>
+    </p:tnLst>
+  </p:timing>
 </p:sld>
 </file>
 
@@ -7248,6 +7595,13 @@
       </p:transition>
     </mc:Fallback>
   </mc:AlternateContent>
+  <p:timing>
+    <p:tnLst>
+      <p:par>
+        <p:cTn id="1" dur="indefinite" restart="never" nodeType="tmRoot"/>
+      </p:par>
+    </p:tnLst>
+  </p:timing>
 </p:sld>
 </file>
 
@@ -7394,6 +7748,13 @@
       </p:transition>
     </mc:Fallback>
   </mc:AlternateContent>
+  <p:timing>
+    <p:tnLst>
+      <p:par>
+        <p:cTn id="1" dur="indefinite" restart="never" nodeType="tmRoot"/>
+      </p:par>
+    </p:tnLst>
+  </p:timing>
 </p:sld>
 </file>
 
@@ -7503,6 +7864,13 @@
       </p:transition>
     </mc:Fallback>
   </mc:AlternateContent>
+  <p:timing>
+    <p:tnLst>
+      <p:par>
+        <p:cTn id="1" dur="indefinite" restart="never" nodeType="tmRoot"/>
+      </p:par>
+    </p:tnLst>
+  </p:timing>
 </p:sld>
 </file>
 
@@ -7619,6 +7987,13 @@
       </p:transition>
     </mc:Fallback>
   </mc:AlternateContent>
+  <p:timing>
+    <p:tnLst>
+      <p:par>
+        <p:cTn id="1" dur="indefinite" restart="never" nodeType="tmRoot"/>
+      </p:par>
+    </p:tnLst>
+  </p:timing>
 </p:sld>
 </file>
 
@@ -7736,6 +8111,13 @@
       </p:transition>
     </mc:Fallback>
   </mc:AlternateContent>
+  <p:timing>
+    <p:tnLst>
+      <p:par>
+        <p:cTn id="1" dur="indefinite" restart="never" nodeType="tmRoot"/>
+      </p:par>
+    </p:tnLst>
+  </p:timing>
 </p:sld>
 </file>
 
@@ -7791,7 +8173,9 @@
         </p:nvSpPr>
         <p:spPr/>
         <p:txBody>
-          <a:bodyPr/>
+          <a:bodyPr>
+            <a:normAutofit lnSpcReduction="10000"/>
+          </a:bodyPr>
           <a:lstStyle/>
           <a:p>
             <a:r>
@@ -7820,8 +8204,13 @@
           <a:p>
             <a:r>
               <a:rPr lang="en-US" dirty="0" smtClean="0"/>
-              <a:t>Starting salaries for 2018 graduates appear to be ranging $75K to $90K and better</a:t>
-            </a:r>
+              <a:t>Starting salaries for 2018 graduates appear to be ranging $75K to $90K and </a:t>
+            </a:r>
+            <a:r>
+              <a:rPr lang="en-US" dirty="0" smtClean="0"/>
+              <a:t>better with signing bonuses of $5K to $10K</a:t>
+            </a:r>
+            <a:endParaRPr lang="en-US" dirty="0" smtClean="0"/>
           </a:p>
         </p:txBody>
       </p:sp>
@@ -7847,6 +8236,13 @@
       </p:transition>
     </mc:Fallback>
   </mc:AlternateContent>
+  <p:timing>
+    <p:tnLst>
+      <p:par>
+        <p:cTn id="1" dur="indefinite" restart="never" nodeType="tmRoot"/>
+      </p:par>
+    </p:tnLst>
+  </p:timing>
 </p:sld>
 </file>
 
@@ -7931,6 +8327,13 @@
       </p:transition>
     </mc:Fallback>
   </mc:AlternateContent>
+  <p:timing>
+    <p:tnLst>
+      <p:par>
+        <p:cTn id="1" dur="indefinite" restart="never" nodeType="tmRoot"/>
+      </p:par>
+    </p:tnLst>
+  </p:timing>
 </p:sld>
 </file>
 
@@ -8189,7 +8592,7 @@
   <a:extraClrSchemeLst/>
   <a:extLst>
     <a:ext uri="{05A4C25C-085E-4340-85A3-A5531E510DB2}">
-      <thm15:themeFamily xmlns="" xmlns:thm15="http://schemas.microsoft.com/office/thememl/2012/main" name="O15_4109default" id="{E728D685-11FC-4812-BA85-57AC6F9C9F40}" vid="{BC4E008B-95FF-4815-904E-143A8EDFC1D4}"/>
+      <thm15:themeFamily xmlns:thm15="http://schemas.microsoft.com/office/thememl/2012/main" xmlns="" name="O15_4109default" id="{E728D685-11FC-4812-BA85-57AC6F9C9F40}" vid="{BC4E008B-95FF-4815-904E-143A8EDFC1D4}"/>
     </a:ext>
   </a:extLst>
 </a:theme>
@@ -8450,7 +8853,7 @@
   <a:extraClrSchemeLst/>
   <a:extLst>
     <a:ext uri="{05A4C25C-085E-4340-85A3-A5531E510DB2}">
-      <thm15:themeFamily xmlns="" xmlns:thm15="http://schemas.microsoft.com/office/thememl/2012/main" name="Office Theme" id="{62F939B6-93AF-4DB8-9C6B-D6C7DFDC589F}" vid="{4A3C46E8-61CC-4603-A589-7422A47A8E4A}"/>
+      <thm15:themeFamily xmlns:thm15="http://schemas.microsoft.com/office/thememl/2012/main" xmlns="" name="Office Theme" id="{62F939B6-93AF-4DB8-9C6B-D6C7DFDC589F}" vid="{4A3C46E8-61CC-4603-A589-7422A47A8E4A}"/>
     </a:ext>
   </a:extLst>
 </a:theme>

</xml_diff>